<commit_message>
add gray-edges.pptx, format microquiz9f.pptx
</commit_message>
<xml_diff>
--- a/spring13/slides13/microquiz9f.pptx
+++ b/spring13/slides13/microquiz9f.pptx
@@ -1182,21 +1182,7 @@
                 <a:latin typeface="Comic Sans MS"/>
                 <a:cs typeface="Comic Sans MS"/>
               </a:rPr>
-              <a:t>6.042 Microquiz</a:t>
-            </a:r>
-            <a:r>
-              <a:rPr lang="en-US" sz="3200" dirty="0" smtClean="0">
-                <a:latin typeface="Comic Sans MS"/>
-                <a:cs typeface="Comic Sans MS"/>
-              </a:rPr>
-              <a:t>9f</a:t>
-            </a:r>
-            <a:r>
-              <a:rPr lang="en-US" sz="3200" dirty="0" smtClean="0">
-                <a:latin typeface="Comic Sans MS"/>
-                <a:cs typeface="Comic Sans MS"/>
-              </a:rPr>
-              <a:t>, 2013</a:t>
+              <a:t>6.042 Microquiz9f, 2013</a:t>
             </a:r>
             <a:endParaRPr lang="en-US" sz="3200" dirty="0">
               <a:latin typeface="Comic Sans MS"/>
@@ -1227,7 +1213,7 @@
           <a:graphicData uri="http://schemas.openxmlformats.org/presentationml/2006/ole">
             <mc:AlternateContent xmlns:mc="http://schemas.openxmlformats.org/markup-compatibility/2006">
               <mc:Choice xmlns:v="urn:schemas-microsoft-com:vml" Requires="v">
-                <p:oleObj spid="_x0000_s1065" name="Equation" r:id="rId3" imgW="114300" imgH="165100" progId="Equation.3">
+                <p:oleObj spid="_x0000_s1067" name="Equation" r:id="rId3" imgW="114300" imgH="165100" progId="Equation.3">
                   <p:embed/>
                 </p:oleObj>
               </mc:Choice>
@@ -1471,20 +1457,7 @@
                           <a:latin typeface="Comic Sans MS"/>
                           <a:cs typeface="Comic Sans MS"/>
                         </a:rPr>
-                        <a:t>(n+1</a:t>
-                      </a:r>
-                      <a:r>
-                        <a:rPr kumimoji="0" lang="en-US" sz="2800" u="none" strike="noStrike" kern="1200" cap="none" spc="0" normalizeH="0" baseline="0" noProof="0" dirty="0" smtClean="0">
-                          <a:ln>
-                            <a:noFill/>
-                          </a:ln>
-                          <a:effectLst/>
-                          <a:uLnTx/>
-                          <a:uFillTx/>
-                          <a:latin typeface="Comic Sans MS"/>
-                          <a:cs typeface="Comic Sans MS"/>
-                        </a:rPr>
-                        <a:t>)</a:t>
+                        <a:t>(n+1)</a:t>
                       </a:r>
                       <a:r>
                         <a:rPr kumimoji="0" lang="en-US" sz="2800" u="none" strike="noStrike" kern="1200" cap="none" spc="0" normalizeH="0" baseline="30000" noProof="0" dirty="0" smtClean="0">
@@ -1566,20 +1539,7 @@
                           <a:latin typeface="Comic Sans MS"/>
                           <a:cs typeface="Comic Sans MS"/>
                         </a:rPr>
-                        <a:t>(</a:t>
-                      </a:r>
-                      <a:r>
-                        <a:rPr kumimoji="0" lang="en-US" sz="2800" u="none" strike="noStrike" kern="1200" cap="none" spc="0" normalizeH="0" baseline="0" noProof="0" dirty="0" smtClean="0">
-                          <a:ln>
-                            <a:noFill/>
-                          </a:ln>
-                          <a:effectLst/>
-                          <a:uLnTx/>
-                          <a:uFillTx/>
-                          <a:latin typeface="Comic Sans MS"/>
-                          <a:cs typeface="Comic Sans MS"/>
-                        </a:rPr>
-                        <a:t>2n)</a:t>
+                        <a:t>(2n)</a:t>
                       </a:r>
                       <a:r>
                         <a:rPr kumimoji="0" lang="en-US" sz="2800" u="none" strike="noStrike" kern="1200" cap="none" spc="0" normalizeH="0" baseline="30000" noProof="0" dirty="0" smtClean="0">

</xml_diff>